<commit_message>
Docs: Update ModelClassDiagram with Homepage class
</commit_message>
<xml_diff>
--- a/docs/diagrams/ModelComponentClassDiagram.pptx
+++ b/docs/diagrams/ModelComponentClassDiagram.pptx
@@ -208,7 +208,7 @@
           <a:p>
             <a:fld id="{F5CC4B3F-88C1-4FFA-B1B6-F41C21DC6924}" type="datetimeFigureOut">
               <a:rPr lang="en-US" smtClean="0"/>
-              <a:t>9/4/17</a:t>
+              <a:t>10/6/17</a:t>
             </a:fld>
             <a:endParaRPr lang="en-US"/>
           </a:p>
@@ -657,7 +657,7 @@
           <a:p>
             <a:fld id="{78C97017-6FC3-485B-9764-EAC9E56C1D49}" type="datetimeFigureOut">
               <a:rPr lang="en-US" smtClean="0"/>
-              <a:t>9/4/17</a:t>
+              <a:t>10/6/17</a:t>
             </a:fld>
             <a:endParaRPr lang="en-US"/>
           </a:p>
@@ -827,7 +827,7 @@
           <a:p>
             <a:fld id="{78C97017-6FC3-485B-9764-EAC9E56C1D49}" type="datetimeFigureOut">
               <a:rPr lang="en-US" smtClean="0"/>
-              <a:t>9/4/17</a:t>
+              <a:t>10/6/17</a:t>
             </a:fld>
             <a:endParaRPr lang="en-US"/>
           </a:p>
@@ -1007,7 +1007,7 @@
           <a:p>
             <a:fld id="{78C97017-6FC3-485B-9764-EAC9E56C1D49}" type="datetimeFigureOut">
               <a:rPr lang="en-US" smtClean="0"/>
-              <a:t>9/4/17</a:t>
+              <a:t>10/6/17</a:t>
             </a:fld>
             <a:endParaRPr lang="en-US"/>
           </a:p>
@@ -1177,7 +1177,7 @@
           <a:p>
             <a:fld id="{78C97017-6FC3-485B-9764-EAC9E56C1D49}" type="datetimeFigureOut">
               <a:rPr lang="en-US" smtClean="0"/>
-              <a:t>9/4/17</a:t>
+              <a:t>10/6/17</a:t>
             </a:fld>
             <a:endParaRPr lang="en-US"/>
           </a:p>
@@ -1423,7 +1423,7 @@
           <a:p>
             <a:fld id="{78C97017-6FC3-485B-9764-EAC9E56C1D49}" type="datetimeFigureOut">
               <a:rPr lang="en-US" smtClean="0"/>
-              <a:t>9/4/17</a:t>
+              <a:t>10/6/17</a:t>
             </a:fld>
             <a:endParaRPr lang="en-US"/>
           </a:p>
@@ -1711,7 +1711,7 @@
           <a:p>
             <a:fld id="{78C97017-6FC3-485B-9764-EAC9E56C1D49}" type="datetimeFigureOut">
               <a:rPr lang="en-US" smtClean="0"/>
-              <a:t>9/4/17</a:t>
+              <a:t>10/6/17</a:t>
             </a:fld>
             <a:endParaRPr lang="en-US"/>
           </a:p>
@@ -2133,7 +2133,7 @@
           <a:p>
             <a:fld id="{78C97017-6FC3-485B-9764-EAC9E56C1D49}" type="datetimeFigureOut">
               <a:rPr lang="en-US" smtClean="0"/>
-              <a:t>9/4/17</a:t>
+              <a:t>10/6/17</a:t>
             </a:fld>
             <a:endParaRPr lang="en-US"/>
           </a:p>
@@ -2251,7 +2251,7 @@
           <a:p>
             <a:fld id="{78C97017-6FC3-485B-9764-EAC9E56C1D49}" type="datetimeFigureOut">
               <a:rPr lang="en-US" smtClean="0"/>
-              <a:t>9/4/17</a:t>
+              <a:t>10/6/17</a:t>
             </a:fld>
             <a:endParaRPr lang="en-US"/>
           </a:p>
@@ -2346,7 +2346,7 @@
           <a:p>
             <a:fld id="{78C97017-6FC3-485B-9764-EAC9E56C1D49}" type="datetimeFigureOut">
               <a:rPr lang="en-US" smtClean="0"/>
-              <a:t>9/4/17</a:t>
+              <a:t>10/6/17</a:t>
             </a:fld>
             <a:endParaRPr lang="en-US"/>
           </a:p>
@@ -2623,7 +2623,7 @@
           <a:p>
             <a:fld id="{78C97017-6FC3-485B-9764-EAC9E56C1D49}" type="datetimeFigureOut">
               <a:rPr lang="en-US" smtClean="0"/>
-              <a:t>9/4/17</a:t>
+              <a:t>10/6/17</a:t>
             </a:fld>
             <a:endParaRPr lang="en-US"/>
           </a:p>
@@ -2876,7 +2876,7 @@
           <a:p>
             <a:fld id="{78C97017-6FC3-485B-9764-EAC9E56C1D49}" type="datetimeFigureOut">
               <a:rPr lang="en-US" smtClean="0"/>
-              <a:t>9/4/17</a:t>
+              <a:t>10/6/17</a:t>
             </a:fld>
             <a:endParaRPr lang="en-US"/>
           </a:p>
@@ -3089,7 +3089,7 @@
           <a:p>
             <a:fld id="{78C97017-6FC3-485B-9764-EAC9E56C1D49}" type="datetimeFigureOut">
               <a:rPr lang="en-US" smtClean="0"/>
-              <a:t>9/4/17</a:t>
+              <a:t>10/6/17</a:t>
             </a:fld>
             <a:endParaRPr lang="en-US"/>
           </a:p>
@@ -5916,6 +5916,102 @@
           </a:p>
         </p:txBody>
       </p:sp>
+      <p:sp>
+        <p:nvSpPr>
+          <p:cNvPr id="55" name="Rectangle 8"/>
+          <p:cNvSpPr/>
+          <p:nvPr/>
+        </p:nvSpPr>
+        <p:spPr>
+          <a:xfrm>
+            <a:off x="7712397" y="3861749"/>
+            <a:ext cx="708186" cy="285783"/>
+          </a:xfrm>
+          <a:prstGeom prst="rect">
+            <a:avLst/>
+          </a:prstGeom>
+          <a:ln w="19050">
+            <a:solidFill>
+              <a:srgbClr val="7030A0"/>
+            </a:solidFill>
+          </a:ln>
+          <a:effectLst/>
+        </p:spPr>
+        <p:style>
+          <a:lnRef idx="1">
+            <a:schemeClr val="accent4"/>
+          </a:lnRef>
+          <a:fillRef idx="2">
+            <a:schemeClr val="accent4"/>
+          </a:fillRef>
+          <a:effectRef idx="1">
+            <a:schemeClr val="accent4"/>
+          </a:effectRef>
+          <a:fontRef idx="minor">
+            <a:schemeClr val="dk1"/>
+          </a:fontRef>
+        </p:style>
+        <p:txBody>
+          <a:bodyPr rtlCol="0" anchor="ctr"/>
+          <a:lstStyle/>
+          <a:p>
+            <a:pPr algn="ctr"/>
+            <a:r>
+              <a:rPr lang="en-US" sz="900" dirty="0" smtClean="0">
+                <a:solidFill>
+                  <a:srgbClr val="7030A0"/>
+                </a:solidFill>
+              </a:rPr>
+              <a:t>Homepage</a:t>
+            </a:r>
+            <a:endParaRPr lang="en-SG" sz="900" dirty="0">
+              <a:solidFill>
+                <a:srgbClr val="7030A0"/>
+              </a:solidFill>
+            </a:endParaRPr>
+          </a:p>
+        </p:txBody>
+      </p:sp>
+      <p:cxnSp>
+        <p:nvCxnSpPr>
+          <p:cNvPr id="73" name="Elbow Connector 72"/>
+          <p:cNvCxnSpPr>
+            <a:endCxn id="55" idx="1"/>
+          </p:cNvCxnSpPr>
+          <p:nvPr/>
+        </p:nvCxnSpPr>
+        <p:spPr>
+          <a:xfrm rot="16200000" flipH="1">
+            <a:off x="7126543" y="3418787"/>
+            <a:ext cx="954506" cy="217202"/>
+          </a:xfrm>
+          <a:prstGeom prst="bentConnector2">
+            <a:avLst/>
+          </a:prstGeom>
+          <a:ln w="19050">
+            <a:solidFill>
+              <a:srgbClr val="7030A0"/>
+            </a:solidFill>
+            <a:headEnd type="none" w="med" len="med"/>
+            <a:tailEnd type="arrow" w="med" len="med"/>
+          </a:ln>
+          <a:effectLst/>
+        </p:spPr>
+        <p:style>
+          <a:lnRef idx="1">
+            <a:schemeClr val="accent2"/>
+          </a:lnRef>
+          <a:fillRef idx="2">
+            <a:schemeClr val="accent2"/>
+          </a:fillRef>
+          <a:effectRef idx="1">
+            <a:schemeClr val="accent2"/>
+          </a:effectRef>
+          <a:fontRef idx="minor">
+            <a:schemeClr val="dk1"/>
+          </a:fontRef>
+        </p:style>
+      </p:cxnSp>
     </p:spTree>
     <p:extLst>
       <p:ext uri="{BB962C8B-B14F-4D97-AF65-F5344CB8AC3E}">

</xml_diff>